<commit_message>
Add spec part 5 in Spanish
</commit_message>
<xml_diff>
--- a/Specification/Spanish/Editable source images/Imágenes Spec Parte 5 - SPU.pptx
+++ b/Specification/Spanish/Editable source images/Imágenes Spec Parte 5 - SPU.pptx
@@ -296,7 +296,7 @@
             <a:fld id="{58855999-87E7-4646-BE91-91594D40D108}" type="datetimeFigureOut">
               <a:rPr lang="es-ES" smtClean="0"/>
               <a:pPr/>
-              <a:t>10/12/2023</a:t>
+              <a:t>30/12/2023</a:t>
             </a:fld>
             <a:endParaRPr lang="es-ES"/>
           </a:p>
@@ -463,7 +463,7 @@
             <a:fld id="{58855999-87E7-4646-BE91-91594D40D108}" type="datetimeFigureOut">
               <a:rPr lang="es-ES" smtClean="0"/>
               <a:pPr/>
-              <a:t>10/12/2023</a:t>
+              <a:t>30/12/2023</a:t>
             </a:fld>
             <a:endParaRPr lang="es-ES"/>
           </a:p>
@@ -640,7 +640,7 @@
             <a:fld id="{58855999-87E7-4646-BE91-91594D40D108}" type="datetimeFigureOut">
               <a:rPr lang="es-ES" smtClean="0"/>
               <a:pPr/>
-              <a:t>10/12/2023</a:t>
+              <a:t>30/12/2023</a:t>
             </a:fld>
             <a:endParaRPr lang="es-ES"/>
           </a:p>
@@ -807,7 +807,7 @@
             <a:fld id="{58855999-87E7-4646-BE91-91594D40D108}" type="datetimeFigureOut">
               <a:rPr lang="es-ES" smtClean="0"/>
               <a:pPr/>
-              <a:t>10/12/2023</a:t>
+              <a:t>30/12/2023</a:t>
             </a:fld>
             <a:endParaRPr lang="es-ES"/>
           </a:p>
@@ -1050,7 +1050,7 @@
             <a:fld id="{58855999-87E7-4646-BE91-91594D40D108}" type="datetimeFigureOut">
               <a:rPr lang="es-ES" smtClean="0"/>
               <a:pPr/>
-              <a:t>10/12/2023</a:t>
+              <a:t>30/12/2023</a:t>
             </a:fld>
             <a:endParaRPr lang="es-ES"/>
           </a:p>
@@ -1335,7 +1335,7 @@
             <a:fld id="{58855999-87E7-4646-BE91-91594D40D108}" type="datetimeFigureOut">
               <a:rPr lang="es-ES" smtClean="0"/>
               <a:pPr/>
-              <a:t>10/12/2023</a:t>
+              <a:t>30/12/2023</a:t>
             </a:fld>
             <a:endParaRPr lang="es-ES"/>
           </a:p>
@@ -1754,7 +1754,7 @@
             <a:fld id="{58855999-87E7-4646-BE91-91594D40D108}" type="datetimeFigureOut">
               <a:rPr lang="es-ES" smtClean="0"/>
               <a:pPr/>
-              <a:t>10/12/2023</a:t>
+              <a:t>30/12/2023</a:t>
             </a:fld>
             <a:endParaRPr lang="es-ES"/>
           </a:p>
@@ -1869,7 +1869,7 @@
             <a:fld id="{58855999-87E7-4646-BE91-91594D40D108}" type="datetimeFigureOut">
               <a:rPr lang="es-ES" smtClean="0"/>
               <a:pPr/>
-              <a:t>10/12/2023</a:t>
+              <a:t>30/12/2023</a:t>
             </a:fld>
             <a:endParaRPr lang="es-ES"/>
           </a:p>
@@ -1961,7 +1961,7 @@
             <a:fld id="{58855999-87E7-4646-BE91-91594D40D108}" type="datetimeFigureOut">
               <a:rPr lang="es-ES" smtClean="0"/>
               <a:pPr/>
-              <a:t>10/12/2023</a:t>
+              <a:t>30/12/2023</a:t>
             </a:fld>
             <a:endParaRPr lang="es-ES"/>
           </a:p>
@@ -2235,7 +2235,7 @@
             <a:fld id="{58855999-87E7-4646-BE91-91594D40D108}" type="datetimeFigureOut">
               <a:rPr lang="es-ES" smtClean="0"/>
               <a:pPr/>
-              <a:t>10/12/2023</a:t>
+              <a:t>30/12/2023</a:t>
             </a:fld>
             <a:endParaRPr lang="es-ES"/>
           </a:p>
@@ -2485,7 +2485,7 @@
             <a:fld id="{58855999-87E7-4646-BE91-91594D40D108}" type="datetimeFigureOut">
               <a:rPr lang="es-ES" smtClean="0"/>
               <a:pPr/>
-              <a:t>10/12/2023</a:t>
+              <a:t>30/12/2023</a:t>
             </a:fld>
             <a:endParaRPr lang="es-ES"/>
           </a:p>
@@ -2695,7 +2695,7 @@
             <a:fld id="{58855999-87E7-4646-BE91-91594D40D108}" type="datetimeFigureOut">
               <a:rPr lang="es-ES" smtClean="0"/>
               <a:pPr/>
-              <a:t>10/12/2023</a:t>
+              <a:t>30/12/2023</a:t>
             </a:fld>
             <a:endParaRPr lang="es-ES"/>
           </a:p>
@@ -3182,15 +3182,7 @@
                   <a:srgbClr val="0070C0"/>
                 </a:solidFill>
               </a:rPr>
-              <a:t> </a:t>
-            </a:r>
-            <a:r>
-              <a:rPr lang="es-ES" sz="2400" smtClean="0">
-                <a:solidFill>
-                  <a:srgbClr val="0070C0"/>
-                </a:solidFill>
-              </a:rPr>
-              <a:t>Consola</a:t>
+              <a:t> Consola</a:t>
             </a:r>
             <a:endParaRPr lang="es-ES" sz="2400">
               <a:solidFill>
@@ -3318,15 +3310,7 @@
                   <a:srgbClr val="006600"/>
                 </a:solidFill>
               </a:rPr>
-              <a:t>(</a:t>
-            </a:r>
-            <a:r>
-              <a:rPr lang="es-ES" sz="1100" smtClean="0">
-                <a:solidFill>
-                  <a:srgbClr val="006600"/>
-                </a:solidFill>
-              </a:rPr>
-              <a:t>sonidos)</a:t>
+              <a:t>(sonidos)</a:t>
             </a:r>
             <a:endParaRPr lang="es-ES" sz="1100">
               <a:solidFill>
@@ -5071,9 +5055,6 @@
               </a:rPr>
               <a:t>Sin modificar</a:t>
             </a:r>
-            <a:endParaRPr lang="es-ES" sz="1600" smtClean="0">
-              <a:latin typeface="Arial Rounded MT Bold" pitchFamily="34" charset="0"/>
-            </a:endParaRPr>
           </a:p>
         </p:txBody>
       </p:sp>
@@ -5103,7 +5084,7 @@
               <a:rPr lang="es-ES" sz="1600" smtClean="0">
                 <a:latin typeface="Arial Rounded MT Bold" pitchFamily="34" charset="0"/>
               </a:rPr>
-              <a:t>Volúmen </a:t>
+              <a:t>Volumen </a:t>
             </a:r>
             <a:r>
               <a:rPr lang="es-ES" sz="1600" smtClean="0">
@@ -5171,13 +5152,7 @@
               <a:rPr lang="es-ES" sz="1600" smtClean="0">
                 <a:latin typeface="Arial Rounded MT Bold" pitchFamily="34" charset="0"/>
               </a:rPr>
-              <a:t>Velocidad = </a:t>
-            </a:r>
-            <a:r>
-              <a:rPr lang="es-ES" sz="1600" smtClean="0">
-                <a:latin typeface="Arial Rounded MT Bold" pitchFamily="34" charset="0"/>
-              </a:rPr>
-              <a:t>2.0</a:t>
+              <a:t>Velocidad = 2.0</a:t>
             </a:r>
           </a:p>
         </p:txBody>
@@ -5270,17 +5245,8 @@
               <a:rPr lang="es-ES" sz="1600" smtClean="0">
                 <a:latin typeface="Arial Rounded MT Bold" pitchFamily="34" charset="0"/>
               </a:rPr>
-              <a:t>Sin </a:t>
-            </a:r>
-            <a:r>
-              <a:rPr lang="es-ES" sz="1600" smtClean="0">
-                <a:latin typeface="Arial Rounded MT Bold" pitchFamily="34" charset="0"/>
-              </a:rPr>
-              <a:t>modificar</a:t>
-            </a:r>
-            <a:endParaRPr lang="es-ES" sz="1600" smtClean="0">
-              <a:latin typeface="Arial Rounded MT Bold" pitchFamily="34" charset="0"/>
-            </a:endParaRPr>
+              <a:t>Sin modificar</a:t>
+            </a:r>
           </a:p>
         </p:txBody>
       </p:sp>
@@ -5359,7 +5325,7 @@
         <p:spPr>
           <a:xfrm>
             <a:off x="3421856" y="1628775"/>
-            <a:ext cx="0" cy="2400300"/>
+            <a:ext cx="0" cy="2383135"/>
           </a:xfrm>
           <a:prstGeom prst="line">
             <a:avLst/>
@@ -5394,7 +5360,7 @@
         <p:spPr>
           <a:xfrm>
             <a:off x="5079206" y="1614487"/>
-            <a:ext cx="0" cy="2386013"/>
+            <a:ext cx="0" cy="2397423"/>
           </a:xfrm>
           <a:prstGeom prst="line">
             <a:avLst/>
@@ -6481,11 +6447,7 @@
             <a:pPr algn="ctr"/>
             <a:r>
               <a:rPr lang="es-ES" sz="1400" b="1" smtClean="0"/>
-              <a:t>Sonido </a:t>
-            </a:r>
-            <a:r>
-              <a:rPr lang="es-ES" sz="1400" b="1" smtClean="0"/>
-              <a:t>asignado al canal</a:t>
+              <a:t>Sonido asignado al canal</a:t>
             </a:r>
             <a:endParaRPr lang="es-ES" sz="1400" b="1"/>
           </a:p>
@@ -6587,11 +6549,7 @@
           <a:p>
             <a:r>
               <a:rPr lang="es-ES" sz="1050" smtClean="0"/>
-              <a:t>Posición  </a:t>
-            </a:r>
-            <a:r>
-              <a:rPr lang="es-ES" sz="1050" smtClean="0"/>
-              <a:t>0</a:t>
+              <a:t>Posición  0</a:t>
             </a:r>
             <a:endParaRPr lang="es-ES" sz="1050"/>
           </a:p>
@@ -6755,11 +6713,7 @@
             <a:pPr algn="r"/>
             <a:r>
               <a:rPr lang="es-ES" sz="1050" smtClean="0"/>
-              <a:t>Posición  (Tamaño-1</a:t>
-            </a:r>
-            <a:r>
-              <a:rPr lang="es-ES" sz="1050" smtClean="0"/>
-              <a:t>)</a:t>
+              <a:t>Posición  (Duración-1)</a:t>
             </a:r>
             <a:endParaRPr lang="es-ES" sz="1050"/>
           </a:p>
@@ -6796,7 +6750,11 @@
             <a:pPr algn="ctr"/>
             <a:r>
               <a:rPr lang="es-ES" sz="1050" smtClean="0"/>
-              <a:t>Volúmen del canal</a:t>
+              <a:t>Volumen </a:t>
+            </a:r>
+            <a:r>
+              <a:rPr lang="es-ES" sz="1050" smtClean="0"/>
+              <a:t>del canal</a:t>
             </a:r>
             <a:endParaRPr lang="es-ES" sz="1050"/>
           </a:p>
@@ -7029,7 +6987,11 @@
             <a:pPr algn="ctr"/>
             <a:r>
               <a:rPr lang="es-ES" sz="1050" smtClean="0"/>
-              <a:t>Volúmen global</a:t>
+              <a:t>Volumen </a:t>
+            </a:r>
+            <a:r>
+              <a:rPr lang="es-ES" sz="1050" smtClean="0"/>
+              <a:t>global</a:t>
             </a:r>
             <a:endParaRPr lang="es-ES" sz="1050"/>
           </a:p>
@@ -8024,7 +7986,6 @@
               <a:rPr lang="es-ES" sz="1200" smtClean="0"/>
               <a:t>Los altavoces</a:t>
             </a:r>
-            <a:endParaRPr lang="es-ES" sz="1200" smtClean="0"/>
           </a:p>
           <a:p>
             <a:r>
@@ -8082,7 +8043,6 @@
               <a:rPr lang="es-ES" sz="1200" smtClean="0"/>
               <a:t>El mezclador</a:t>
             </a:r>
-            <a:endParaRPr lang="es-ES" sz="1200" smtClean="0"/>
           </a:p>
           <a:p>
             <a:pPr algn="ctr"/>
@@ -8676,15 +8636,7 @@
                   <a:srgbClr val="00AC56"/>
                 </a:solidFill>
               </a:rPr>
-              <a:t>Para </a:t>
-            </a:r>
-            <a:r>
-              <a:rPr lang="es-ES" sz="1100" smtClean="0">
-                <a:solidFill>
-                  <a:srgbClr val="00AC56"/>
-                </a:solidFill>
-              </a:rPr>
-              <a:t>re-producir</a:t>
+              <a:t>Para re-producir</a:t>
             </a:r>
             <a:endParaRPr lang="es-ES" sz="1100">
               <a:solidFill>
@@ -8742,11 +8694,6 @@
               </a:rPr>
               <a:t>Reprodu-ciendo</a:t>
             </a:r>
-            <a:endParaRPr lang="es-ES" sz="1100" b="1" smtClean="0">
-              <a:solidFill>
-                <a:srgbClr val="003300"/>
-              </a:solidFill>
-            </a:endParaRPr>
           </a:p>
         </p:txBody>
       </p:sp>

</xml_diff>